<commit_message>
create sound-valid.pptx out of 2nd part of implies.pptx, format contradiction.pptx
</commit_message>
<xml_diff>
--- a/spring17/slidesS17/contradiction.pptx
+++ b/spring17/slidesS17/contradiction.pptx
@@ -2380,8 +2380,8 @@
         </p:blipFill>
         <p:spPr>
           <a:xfrm>
-            <a:off x="14941" y="6500091"/>
-            <a:ext cx="1016000" cy="357909"/>
+            <a:off x="88921" y="6554882"/>
+            <a:ext cx="860464" cy="303118"/>
           </a:xfrm>
           <a:prstGeom prst="rect">
             <a:avLst/>
@@ -2984,7 +2984,7 @@
   <p:clrMapOvr>
     <a:masterClrMapping/>
   </p:clrMapOvr>
-  <p:transition xmlns:p14="http://schemas.microsoft.com/office/powerpoint/2010/main"/>
+  <p:transition xmlns:p14="http://schemas.microsoft.com/office/powerpoint/2010/main" advClick="0"/>
   <p:timing>
     <p:tnLst>
       <p:par>
@@ -3028,7 +3028,7 @@
           <a:graphicData uri="http://schemas.openxmlformats.org/presentationml/2006/ole">
             <mc:AlternateContent xmlns:mc="http://schemas.openxmlformats.org/markup-compatibility/2006">
               <mc:Choice xmlns:v="urn:schemas-microsoft-com:vml" Requires="v">
-                <p:oleObj spid="_x0000_s338076" name="Equation" r:id="rId4" imgW="2984500" imgH="596900" progId="Equation.DSMT4">
+                <p:oleObj spid="_x0000_s338087" name="Equation" r:id="rId4" imgW="2984500" imgH="596900" progId="Equation.DSMT4">
                   <p:embed/>
                 </p:oleObj>
               </mc:Choice>
@@ -3121,7 +3121,7 @@
           <a:graphicData uri="http://schemas.openxmlformats.org/presentationml/2006/ole">
             <mc:AlternateContent xmlns:mc="http://schemas.openxmlformats.org/markup-compatibility/2006">
               <mc:Choice xmlns:v="urn:schemas-microsoft-com:vml" Requires="v">
-                <p:oleObj spid="_x0000_s338077" name="Equation" r:id="rId6" imgW="3759200" imgH="673100" progId="Equation.DSMT4">
+                <p:oleObj spid="_x0000_s338088" name="Equation" r:id="rId6" imgW="3759200" imgH="673100" progId="Equation.DSMT4">
                   <p:embed/>
                 </p:oleObj>
               </mc:Choice>
@@ -3241,7 +3241,7 @@
           <a:graphicData uri="http://schemas.openxmlformats.org/presentationml/2006/ole">
             <mc:AlternateContent xmlns:mc="http://schemas.openxmlformats.org/markup-compatibility/2006">
               <mc:Choice xmlns:v="urn:schemas-microsoft-com:vml" Requires="v">
-                <p:oleObj spid="_x0000_s338078" name="Equation" r:id="rId8" imgW="253800" imgH="317160" progId="Equation.DSMT4">
+                <p:oleObj spid="_x0000_s338089" name="Equation" r:id="rId8" imgW="253800" imgH="317160" progId="Equation.DSMT4">
                   <p:embed/>
                 </p:oleObj>
               </mc:Choice>
@@ -3310,7 +3310,7 @@
           <a:graphicData uri="http://schemas.openxmlformats.org/presentationml/2006/ole">
             <mc:AlternateContent xmlns:mc="http://schemas.openxmlformats.org/markup-compatibility/2006">
               <mc:Choice xmlns:v="urn:schemas-microsoft-com:vml" Requires="v">
-                <p:oleObj spid="_x0000_s338079" name="Equation" r:id="rId10" imgW="2032000" imgH="596900" progId="Equation.3">
+                <p:oleObj spid="_x0000_s338090" name="Equation" r:id="rId10" imgW="2032000" imgH="596900" progId="Equation.3">
                   <p:embed/>
                 </p:oleObj>
               </mc:Choice>
@@ -3417,7 +3417,7 @@
           <a:graphicData uri="http://schemas.openxmlformats.org/presentationml/2006/ole">
             <mc:AlternateContent xmlns:mc="http://schemas.openxmlformats.org/markup-compatibility/2006">
               <mc:Choice xmlns:v="urn:schemas-microsoft-com:vml" Requires="v">
-                <p:oleObj spid="_x0000_s338080" name="Equation" r:id="rId12" imgW="876300" imgH="368300" progId="Equation.DSMT4">
+                <p:oleObj spid="_x0000_s338091" name="Equation" r:id="rId12" imgW="876300" imgH="368300" progId="Equation.DSMT4">
                   <p:embed/>
                 </p:oleObj>
               </mc:Choice>
@@ -3469,14 +3469,14 @@
   <p:clrMapOvr>
     <a:masterClrMapping/>
   </p:clrMapOvr>
-  <mc:AlternateContent xmlns:mc="http://schemas.openxmlformats.org/markup-compatibility/2006" xmlns:p14="http://schemas.microsoft.com/office/powerpoint/2010/main">
-    <mc:Choice Requires="p14">
-      <p:transition spd="med" p14:dur="700">
+  <mc:AlternateContent xmlns:mc="http://schemas.openxmlformats.org/markup-compatibility/2006">
+    <mc:Choice xmlns:p14="http://schemas.microsoft.com/office/powerpoint/2010/main" Requires="p14">
+      <p:transition spd="med" p14:dur="700" advClick="0">
         <p:fade thruBlk="1"/>
       </p:transition>
     </mc:Choice>
-    <mc:Fallback xmlns="">
-      <p:transition xmlns:p14="http://schemas.microsoft.com/office/powerpoint/2010/main" spd="med">
+    <mc:Fallback>
+      <p:transition xmlns:p14="http://schemas.microsoft.com/office/powerpoint/2010/main" spd="med" advClick="0">
         <p:fade thruBlk="1"/>
       </p:transition>
     </mc:Fallback>
@@ -3961,7 +3961,7 @@
           <a:graphicData uri="http://schemas.openxmlformats.org/presentationml/2006/ole">
             <mc:AlternateContent xmlns:mc="http://schemas.openxmlformats.org/markup-compatibility/2006">
               <mc:Choice xmlns:v="urn:schemas-microsoft-com:vml" Requires="v">
-                <p:oleObj spid="_x0000_s327723" name="Equation" r:id="rId4" imgW="914400" imgH="406080" progId="Equation.DSMT4">
+                <p:oleObj spid="_x0000_s327726" name="Equation" r:id="rId4" imgW="914400" imgH="406080" progId="Equation.DSMT4">
                   <p:embed/>
                 </p:oleObj>
               </mc:Choice>
@@ -4091,15 +4091,15 @@
   <p:clrMapOvr>
     <a:masterClrMapping/>
   </p:clrMapOvr>
-  <mc:AlternateContent xmlns:mc="http://schemas.openxmlformats.org/markup-compatibility/2006" xmlns:p14="http://schemas.microsoft.com/office/powerpoint/2010/main">
-    <mc:Choice Requires="p14">
-      <p:transition spd="med" p14:dur="700">
-        <p:fade/>
+  <mc:AlternateContent xmlns:mc="http://schemas.openxmlformats.org/markup-compatibility/2006">
+    <mc:Choice xmlns:p14="http://schemas.microsoft.com/office/powerpoint/2010/main" Requires="p14">
+      <p:transition spd="med" p14:dur="700" advClick="0">
+        <p:fade thruBlk="1"/>
       </p:transition>
     </mc:Choice>
-    <mc:Fallback xmlns="">
-      <p:transition xmlns:p14="http://schemas.microsoft.com/office/powerpoint/2010/main" spd="med">
-        <p:fade/>
+    <mc:Fallback>
+      <p:transition xmlns:p14="http://schemas.microsoft.com/office/powerpoint/2010/main" spd="med" advClick="0">
+        <p:fade thruBlk="1"/>
       </p:transition>
     </mc:Fallback>
   </mc:AlternateContent>
@@ -4547,7 +4547,7 @@
           <a:graphicData uri="http://schemas.openxmlformats.org/presentationml/2006/ole">
             <mc:AlternateContent xmlns:mc="http://schemas.openxmlformats.org/markup-compatibility/2006">
               <mc:Choice xmlns:v="urn:schemas-microsoft-com:vml" Requires="v">
-                <p:oleObj spid="_x0000_s248932" name="Equation" r:id="rId4" imgW="241200" imgH="215640" progId="Equation.DSMT4">
+                <p:oleObj spid="_x0000_s248939" name="Equation" r:id="rId4" imgW="241200" imgH="215640" progId="Equation.DSMT4">
                   <p:embed/>
                 </p:oleObj>
               </mc:Choice>
@@ -4617,7 +4617,7 @@
           <a:graphicData uri="http://schemas.openxmlformats.org/presentationml/2006/ole">
             <mc:AlternateContent xmlns:mc="http://schemas.openxmlformats.org/markup-compatibility/2006">
               <mc:Choice xmlns:v="urn:schemas-microsoft-com:vml" Requires="v">
-                <p:oleObj spid="_x0000_s248933" name="Equation" r:id="rId6" imgW="241200" imgH="215640" progId="Equation.DSMT4">
+                <p:oleObj spid="_x0000_s248940" name="Equation" r:id="rId6" imgW="241200" imgH="215640" progId="Equation.DSMT4">
                   <p:embed/>
                 </p:oleObj>
               </mc:Choice>
@@ -4687,7 +4687,7 @@
           <a:graphicData uri="http://schemas.openxmlformats.org/presentationml/2006/ole">
             <mc:AlternateContent xmlns:mc="http://schemas.openxmlformats.org/markup-compatibility/2006">
               <mc:Choice xmlns:v="urn:schemas-microsoft-com:vml" Requires="v">
-                <p:oleObj spid="_x0000_s248934" name="Equation" r:id="rId8" imgW="507960" imgH="419040" progId="Equation.DSMT4">
+                <p:oleObj spid="_x0000_s248941" name="Equation" r:id="rId8" imgW="507960" imgH="419040" progId="Equation.DSMT4">
                   <p:embed/>
                 </p:oleObj>
               </mc:Choice>
@@ -4789,18 +4789,9 @@
   <p:clrMapOvr>
     <a:masterClrMapping/>
   </p:clrMapOvr>
-  <mc:AlternateContent xmlns:mc="http://schemas.openxmlformats.org/markup-compatibility/2006" xmlns:p14="http://schemas.microsoft.com/office/powerpoint/2010/main">
-    <mc:Choice Requires="p14">
-      <p:transition spd="med" p14:dur="700">
-        <p:fade thruBlk="1"/>
-      </p:transition>
-    </mc:Choice>
-    <mc:Fallback xmlns="">
-      <p:transition xmlns:p14="http://schemas.microsoft.com/office/powerpoint/2010/main" spd="med">
-        <p:fade thruBlk="1"/>
-      </p:transition>
-    </mc:Fallback>
-  </mc:AlternateContent>
+  <p:transition xmlns:p14="http://schemas.microsoft.com/office/powerpoint/2010/main" spd="slow" advClick="0">
+    <p:fade thruBlk="1"/>
+  </p:transition>
   <p:timing>
     <p:tnLst>
       <p:par>
@@ -5265,7 +5256,7 @@
           <a:graphicData uri="http://schemas.openxmlformats.org/presentationml/2006/ole">
             <mc:AlternateContent xmlns:mc="http://schemas.openxmlformats.org/markup-compatibility/2006">
               <mc:Choice xmlns:v="urn:schemas-microsoft-com:vml" Requires="v">
-                <p:oleObj spid="_x0000_s402718" name="Equation" r:id="rId4" imgW="431640" imgH="190440" progId="Equation.DSMT4">
+                <p:oleObj spid="_x0000_s402737" name="Equation" r:id="rId4" imgW="431640" imgH="190440" progId="Equation.DSMT4">
                   <p:embed/>
                 </p:oleObj>
               </mc:Choice>
@@ -5374,7 +5365,7 @@
           <a:graphicData uri="http://schemas.openxmlformats.org/presentationml/2006/ole">
             <mc:AlternateContent xmlns:mc="http://schemas.openxmlformats.org/markup-compatibility/2006">
               <mc:Choice xmlns:v="urn:schemas-microsoft-com:vml" Requires="v">
-                <p:oleObj spid="_x0000_s402719" name="Equation" r:id="rId6" imgW="571320" imgH="203040" progId="Equation.DSMT4">
+                <p:oleObj spid="_x0000_s402738" name="Equation" r:id="rId6" imgW="571320" imgH="203040" progId="Equation.DSMT4">
                   <p:embed/>
                 </p:oleObj>
               </mc:Choice>
@@ -5444,7 +5435,7 @@
           <a:graphicData uri="http://schemas.openxmlformats.org/presentationml/2006/ole">
             <mc:AlternateContent xmlns:mc="http://schemas.openxmlformats.org/markup-compatibility/2006">
               <mc:Choice xmlns:v="urn:schemas-microsoft-com:vml" Requires="v">
-                <p:oleObj spid="_x0000_s402720" name="Equation" r:id="rId8" imgW="583920" imgH="215640" progId="Equation.DSMT4">
+                <p:oleObj spid="_x0000_s402739" name="Equation" r:id="rId8" imgW="583920" imgH="215640" progId="Equation.DSMT4">
                   <p:embed/>
                 </p:oleObj>
               </mc:Choice>
@@ -5614,7 +5605,7 @@
           <a:graphicData uri="http://schemas.openxmlformats.org/presentationml/2006/ole">
             <mc:AlternateContent xmlns:mc="http://schemas.openxmlformats.org/markup-compatibility/2006">
               <mc:Choice xmlns:v="urn:schemas-microsoft-com:vml" Requires="v">
-                <p:oleObj spid="_x0000_s402721" name="Equation" r:id="rId10" imgW="507960" imgH="419040" progId="Equation.DSMT4">
+                <p:oleObj spid="_x0000_s402740" name="Equation" r:id="rId10" imgW="507960" imgH="419040" progId="Equation.DSMT4">
                   <p:embed/>
                 </p:oleObj>
               </mc:Choice>
@@ -5684,7 +5675,7 @@
           <a:graphicData uri="http://schemas.openxmlformats.org/presentationml/2006/ole">
             <mc:AlternateContent xmlns:mc="http://schemas.openxmlformats.org/markup-compatibility/2006">
               <mc:Choice xmlns:v="urn:schemas-microsoft-com:vml" Requires="v">
-                <p:oleObj spid="_x0000_s402722" name="Equation" r:id="rId12" imgW="533160" imgH="215640" progId="Equation.DSMT4">
+                <p:oleObj spid="_x0000_s402741" name="Equation" r:id="rId12" imgW="533160" imgH="215640" progId="Equation.DSMT4">
                   <p:embed/>
                 </p:oleObj>
               </mc:Choice>
@@ -5754,7 +5745,7 @@
           <a:graphicData uri="http://schemas.openxmlformats.org/presentationml/2006/ole">
             <mc:AlternateContent xmlns:mc="http://schemas.openxmlformats.org/markup-compatibility/2006">
               <mc:Choice xmlns:v="urn:schemas-microsoft-com:vml" Requires="v">
-                <p:oleObj spid="_x0000_s402723" name="Equation" r:id="rId14" imgW="558720" imgH="203040" progId="Equation.DSMT4">
+                <p:oleObj spid="_x0000_s402742" name="Equation" r:id="rId14" imgW="558720" imgH="203040" progId="Equation.DSMT4">
                   <p:embed/>
                 </p:oleObj>
               </mc:Choice>
@@ -5935,7 +5926,7 @@
           <a:graphicData uri="http://schemas.openxmlformats.org/presentationml/2006/ole">
             <mc:AlternateContent xmlns:mc="http://schemas.openxmlformats.org/markup-compatibility/2006">
               <mc:Choice xmlns:v="urn:schemas-microsoft-com:vml" Requires="v">
-                <p:oleObj spid="_x0000_s402724" name="Equation" r:id="rId16" imgW="672840" imgH="203040" progId="Equation.DSMT4">
+                <p:oleObj spid="_x0000_s402743" name="Equation" r:id="rId16" imgW="672840" imgH="203040" progId="Equation.DSMT4">
                   <p:embed/>
                 </p:oleObj>
               </mc:Choice>
@@ -6157,7 +6148,7 @@
           <a:graphicData uri="http://schemas.openxmlformats.org/presentationml/2006/ole">
             <mc:AlternateContent xmlns:mc="http://schemas.openxmlformats.org/markup-compatibility/2006">
               <mc:Choice xmlns:v="urn:schemas-microsoft-com:vml" Requires="v">
-                <p:oleObj spid="_x0000_s402725" name="Equation" r:id="rId18" imgW="114120" imgH="177480" progId="Equation.DSMT4">
+                <p:oleObj spid="_x0000_s402744" name="Equation" r:id="rId18" imgW="114120" imgH="177480" progId="Equation.DSMT4">
                   <p:embed/>
                 </p:oleObj>
               </mc:Choice>
@@ -6227,7 +6218,7 @@
           <a:graphicData uri="http://schemas.openxmlformats.org/presentationml/2006/ole">
             <mc:AlternateContent xmlns:mc="http://schemas.openxmlformats.org/markup-compatibility/2006">
               <mc:Choice xmlns:v="urn:schemas-microsoft-com:vml" Requires="v">
-                <p:oleObj spid="_x0000_s402726" name="Equation" r:id="rId20" imgW="241200" imgH="215640" progId="Equation.DSMT4">
+                <p:oleObj spid="_x0000_s402745" name="Equation" r:id="rId20" imgW="241200" imgH="215640" progId="Equation.DSMT4">
                   <p:embed/>
                 </p:oleObj>
               </mc:Choice>
@@ -6363,18 +6354,9 @@
   <p:clrMapOvr>
     <a:masterClrMapping/>
   </p:clrMapOvr>
-  <mc:AlternateContent xmlns:mc="http://schemas.openxmlformats.org/markup-compatibility/2006" xmlns:p14="http://schemas.microsoft.com/office/powerpoint/2010/main">
-    <mc:Choice Requires="p14">
-      <p:transition p14:dur="300">
-        <p:fade/>
-      </p:transition>
-    </mc:Choice>
-    <mc:Fallback xmlns="">
-      <p:transition xmlns:p14="http://schemas.microsoft.com/office/powerpoint/2010/main">
-        <p:fade/>
-      </p:transition>
-    </mc:Fallback>
-  </mc:AlternateContent>
+  <p:transition xmlns:p14="http://schemas.microsoft.com/office/powerpoint/2010/main" spd="slow" advClick="0">
+    <p:fade/>
+  </p:transition>
   <p:timing>
     <p:tnLst>
       <p:par>
@@ -7430,18 +7412,9 @@
   <p:clrMapOvr>
     <a:masterClrMapping/>
   </p:clrMapOvr>
-  <mc:AlternateContent xmlns:mc="http://schemas.openxmlformats.org/markup-compatibility/2006" xmlns:p14="http://schemas.microsoft.com/office/powerpoint/2010/main">
-    <mc:Choice Requires="p14">
-      <p:transition p14:dur="300">
-        <p:fade thruBlk="1"/>
-      </p:transition>
-    </mc:Choice>
-    <mc:Fallback xmlns="">
-      <p:transition xmlns:p14="http://schemas.microsoft.com/office/powerpoint/2010/main">
-        <p:fade thruBlk="1"/>
-      </p:transition>
-    </mc:Fallback>
-  </mc:AlternateContent>
+  <p:transition xmlns:p14="http://schemas.microsoft.com/office/powerpoint/2010/main" spd="slow" advClick="0">
+    <p:fade thruBlk="1"/>
+  </p:transition>
   <p:timing>
     <p:tnLst>
       <p:par>

</xml_diff>